<commit_message>
[add] ptn de bloc
</commit_message>
<xml_diff>
--- a/Templates/BNP Paribas.pptx
+++ b/Templates/BNP Paribas.pptx
@@ -21759,7 +21759,7 @@
         <p:spPr>
           <a:xfrm>
             <a:off x="458462" y="974579"/>
-            <a:ext cx="6741374" cy="3539430"/>
+            <a:ext cx="6741374" cy="3513782"/>
           </a:xfrm>
           <a:prstGeom prst="rect">
             <a:avLst/>
@@ -22605,10 +22605,24 @@
                 <a:ea typeface="+mn-ea"/>
                 <a:cs typeface="+mn-cs"/>
               </a:rPr>
-              <a:t>ou égal à &lt;ABAC&gt; &lt;balisedeg1&gt;</a:t>
-            </a:r>
-            <a:r>
-              <a:rPr kumimoji="0" lang="fr-FR" sz="800" b="0" i="0" u="none" strike="noStrike" kern="1200" cap="none" spc="0" normalizeH="0" baseline="0" noProof="0" dirty="0">
+              <a:t>ou égal à &lt;ABAC&gt;  </a:t>
+            </a:r>
+            <a:r>
+              <a:rPr kumimoji="0" lang="fr-FR" sz="800" b="0" i="0" u="none" strike="noStrike" kern="1200" cap="none" spc="0" normalizeH="0" baseline="0" noProof="0">
+                <a:ln>
+                  <a:noFill/>
+                </a:ln>
+                <a:effectLst/>
+                <a:uLnTx/>
+                <a:uFillTx/>
+                <a:latin typeface="Proxima Nova Rg"/>
+                <a:ea typeface="+mn-ea"/>
+                <a:cs typeface="+mn-cs"/>
+              </a:rPr>
+              <a:t>&lt;balisedeg1&gt;</a:t>
+            </a:r>
+            <a:r>
+              <a:rPr kumimoji="0" lang="fr-FR" sz="800" b="0" i="0" u="none" strike="noStrike" kern="1200" cap="none" spc="0" normalizeH="0" baseline="0" noProof="0">
                 <a:ln>
                   <a:noFill/>
                 </a:ln>
@@ -22628,18 +22642,18 @@
               <a:effectLst/>
               <a:uLnTx/>
               <a:uFillTx/>
-              <a:latin typeface="Proxima Nova Rg"/>
+              <a:latin typeface="Proxima Nova Rg" panose="02000506030000020004" pitchFamily="2" charset="0"/>
               <a:ea typeface="+mn-ea"/>
               <a:cs typeface="+mn-cs"/>
             </a:endParaRPr>
           </a:p>
           <a:p>
-            <a:pPr marL="0" marR="0" lvl="1" indent="0" algn="just" defTabSz="755934" rtl="0" eaLnBrk="1" fontAlgn="auto" latinLnBrk="0" hangingPunct="1">
+            <a:pPr marL="0" marR="0" lvl="2" indent="0" algn="just" defTabSz="755934" rtl="0" eaLnBrk="1" fontAlgn="auto" latinLnBrk="0" hangingPunct="1">
               <a:lnSpc>
                 <a:spcPct val="90000"/>
               </a:lnSpc>
               <a:spcBef>
-                <a:spcPts val="600"/>
+                <a:spcPts val="400"/>
               </a:spcBef>
               <a:spcAft>
                 <a:spcPts val="200"/>
@@ -24588,7 +24602,35 @@
                 <a:ea typeface="+mn-ea"/>
                 <a:cs typeface="+mn-cs"/>
               </a:rPr>
-              <a:t>&lt;ABAC2&gt;.</a:t>
+              <a:t>&lt;ABAC2&gt;</a:t>
+            </a:r>
+            <a:r>
+              <a:rPr kumimoji="0" lang="fr-FR" sz="800" b="0" i="0" u="none" strike="noStrike" kern="1200" cap="none" spc="0" normalizeH="0" baseline="0" noProof="0" dirty="0">
+                <a:ln>
+                  <a:noFill/>
+                </a:ln>
+                <a:effectLst/>
+                <a:uLnTx/>
+                <a:uFillTx/>
+                <a:latin typeface="Proxima Nova Rg"/>
+                <a:ea typeface="+mn-ea"/>
+                <a:cs typeface="+mn-cs"/>
+              </a:rPr>
+              <a:t> &lt;balisedeg1&gt;</a:t>
+            </a:r>
+            <a:r>
+              <a:rPr kumimoji="0" lang="fr-FR" sz="800" b="0" i="0" u="none" strike="noStrike" kern="1200" cap="none" spc="0" normalizeH="0" baseline="0" noProof="0" dirty="0">
+                <a:ln>
+                  <a:noFill/>
+                </a:ln>
+                <a:effectLst/>
+                <a:uLnTx/>
+                <a:uFillTx/>
+                <a:latin typeface="Proxima Nova Rg" panose="02000506030000020004" pitchFamily="2" charset="0"/>
+                <a:ea typeface="+mn-ea"/>
+                <a:cs typeface="+mn-cs"/>
+              </a:rPr>
+              <a:t>.</a:t>
             </a:r>
             <a:endParaRPr kumimoji="0" lang="fr-FR" sz="800" b="0" i="0" u="none" strike="noStrike" kern="1200" cap="none" spc="0" normalizeH="0" baseline="0" noProof="0" dirty="0">
               <a:ln>
@@ -37123,18 +37165,6 @@
 </file>
 
 <file path=customXml/item1.xml><?xml version="1.0" encoding="utf-8"?>
-<p:properties xmlns:p="http://schemas.microsoft.com/office/2006/metadata/properties" xmlns:xsi="http://www.w3.org/2001/XMLSchema-instance" xmlns:pc="http://schemas.microsoft.com/office/infopath/2007/PartnerControls">
-  <documentManagement>
-    <_Flow_SignoffStatus xmlns="ef624bc2-1644-4d69-8362-5c28ca496374" xsi:nil="true"/>
-    <TaxCatchAll xmlns="514a554b-82b0-4359-b247-fc84018a95f0" xsi:nil="true"/>
-    <lcf76f155ced4ddcb4097134ff3c332f xmlns="ef624bc2-1644-4d69-8362-5c28ca496374">
-      <Terms xmlns="http://schemas.microsoft.com/office/infopath/2007/PartnerControls"/>
-    </lcf76f155ced4ddcb4097134ff3c332f>
-  </documentManagement>
-</p:properties>
-</file>
-
-<file path=customXml/item2.xml><?xml version="1.0" encoding="utf-8"?>
 <ct:contentTypeSchema xmlns:ct="http://schemas.microsoft.com/office/2006/metadata/contentType" xmlns:ma="http://schemas.microsoft.com/office/2006/metadata/properties/metaAttributes" ct:_="" ma:_="" ma:contentTypeName="Document" ma:contentTypeID="0x0101005DDE610BC516E448BB8152259F39635A" ma:contentTypeVersion="17" ma:contentTypeDescription="Crée un document." ma:contentTypeScope="" ma:versionID="bfb75e103009df80b8e5001438c41194">
   <xsd:schema xmlns:xsd="http://www.w3.org/2001/XMLSchema" xmlns:xs="http://www.w3.org/2001/XMLSchema" xmlns:p="http://schemas.microsoft.com/office/2006/metadata/properties" xmlns:ns2="ef624bc2-1644-4d69-8362-5c28ca496374" xmlns:ns3="514a554b-82b0-4359-b247-fc84018a95f0" targetNamespace="http://schemas.microsoft.com/office/2006/metadata/properties" ma:root="true" ma:fieldsID="2ae3df86d13efbb4a35042af2564d386" ns2:_="" ns3:_="">
     <xsd:import namespace="ef624bc2-1644-4d69-8362-5c28ca496374"/>
@@ -37383,7 +37413,7 @@
 </ct:contentTypeSchema>
 </file>
 
-<file path=customXml/item3.xml><?xml version="1.0" encoding="utf-8"?>
+<file path=customXml/item2.xml><?xml version="1.0" encoding="utf-8"?>
 <?mso-contentType ?>
 <FormTemplates xmlns="http://schemas.microsoft.com/sharepoint/v3/contenttype/forms">
   <Display>DocumentLibraryForm</Display>
@@ -37392,24 +37422,19 @@
 </FormTemplates>
 </file>
 
-<file path=customXml/itemProps1.xml><?xml version="1.0" encoding="utf-8"?>
-<ds:datastoreItem xmlns:ds="http://schemas.openxmlformats.org/officeDocument/2006/customXml" ds:itemID="{25DE574B-2CD2-4078-9BEA-2A14717D9698}">
-  <ds:schemaRefs>
-    <ds:schemaRef ds:uri="http://purl.org/dc/terms/"/>
-    <ds:schemaRef ds:uri="514a554b-82b0-4359-b247-fc84018a95f0"/>
-    <ds:schemaRef ds:uri="http://schemas.openxmlformats.org/package/2006/metadata/core-properties"/>
-    <ds:schemaRef ds:uri="http://purl.org/dc/elements/1.1/"/>
-    <ds:schemaRef ds:uri="http://schemas.microsoft.com/office/infopath/2007/PartnerControls"/>
-    <ds:schemaRef ds:uri="http://schemas.microsoft.com/office/2006/documentManagement/types"/>
-    <ds:schemaRef ds:uri="ef624bc2-1644-4d69-8362-5c28ca496374"/>
-    <ds:schemaRef ds:uri="http://schemas.microsoft.com/office/2006/metadata/properties"/>
-    <ds:schemaRef ds:uri="http://www.w3.org/XML/1998/namespace"/>
-    <ds:schemaRef ds:uri="http://purl.org/dc/dcmitype/"/>
-  </ds:schemaRefs>
-</ds:datastoreItem>
+<file path=customXml/item3.xml><?xml version="1.0" encoding="utf-8"?>
+<p:properties xmlns:p="http://schemas.microsoft.com/office/2006/metadata/properties" xmlns:xsi="http://www.w3.org/2001/XMLSchema-instance" xmlns:pc="http://schemas.microsoft.com/office/infopath/2007/PartnerControls">
+  <documentManagement>
+    <_Flow_SignoffStatus xmlns="ef624bc2-1644-4d69-8362-5c28ca496374" xsi:nil="true"/>
+    <TaxCatchAll xmlns="514a554b-82b0-4359-b247-fc84018a95f0" xsi:nil="true"/>
+    <lcf76f155ced4ddcb4097134ff3c332f xmlns="ef624bc2-1644-4d69-8362-5c28ca496374">
+      <Terms xmlns="http://schemas.microsoft.com/office/infopath/2007/PartnerControls"/>
+    </lcf76f155ced4ddcb4097134ff3c332f>
+  </documentManagement>
+</p:properties>
 </file>
 
-<file path=customXml/itemProps2.xml><?xml version="1.0" encoding="utf-8"?>
+<file path=customXml/itemProps1.xml><?xml version="1.0" encoding="utf-8"?>
 <ds:datastoreItem xmlns:ds="http://schemas.openxmlformats.org/officeDocument/2006/customXml" ds:itemID="{049ECCCF-890C-4C54-BAB4-06AB610C1865}">
   <ds:schemaRefs>
     <ds:schemaRef ds:uri="http://schemas.microsoft.com/office/2006/metadata/contentType"/>
@@ -37428,10 +37453,27 @@
 </ds:datastoreItem>
 </file>
 
-<file path=customXml/itemProps3.xml><?xml version="1.0" encoding="utf-8"?>
+<file path=customXml/itemProps2.xml><?xml version="1.0" encoding="utf-8"?>
 <ds:datastoreItem xmlns:ds="http://schemas.openxmlformats.org/officeDocument/2006/customXml" ds:itemID="{B00FC41E-FBDE-42E2-B58A-20EBD240A376}">
   <ds:schemaRefs>
     <ds:schemaRef ds:uri="http://schemas.microsoft.com/sharepoint/v3/contenttype/forms"/>
   </ds:schemaRefs>
 </ds:datastoreItem>
+</file>
+
+<file path=customXml/itemProps3.xml><?xml version="1.0" encoding="utf-8"?>
+<ds:datastoreItem xmlns:ds="http://schemas.openxmlformats.org/officeDocument/2006/customXml" ds:itemID="{25DE574B-2CD2-4078-9BEA-2A14717D9698}">
+  <ds:schemaRefs>
+    <ds:schemaRef ds:uri="http://purl.org/dc/terms/"/>
+    <ds:schemaRef ds:uri="514a554b-82b0-4359-b247-fc84018a95f0"/>
+    <ds:schemaRef ds:uri="http://schemas.openxmlformats.org/package/2006/metadata/core-properties"/>
+    <ds:schemaRef ds:uri="http://purl.org/dc/elements/1.1/"/>
+    <ds:schemaRef ds:uri="http://schemas.microsoft.com/office/infopath/2007/PartnerControls"/>
+    <ds:schemaRef ds:uri="http://schemas.microsoft.com/office/2006/documentManagement/types"/>
+    <ds:schemaRef ds:uri="ef624bc2-1644-4d69-8362-5c28ca496374"/>
+    <ds:schemaRef ds:uri="http://schemas.microsoft.com/office/2006/metadata/properties"/>
+    <ds:schemaRef ds:uri="http://www.w3.org/XML/1998/namespace"/>
+    <ds:schemaRef ds:uri="http://purl.org/dc/dcmitype/"/>
+  </ds:schemaRefs>
+</ds:datastoreItem>
 </file>
</xml_diff>